<commit_message>
saving before one game dev states
</commit_message>
<xml_diff>
--- a/new_code/thesis_figs.pptx
+++ b/new_code/thesis_figs.pptx
@@ -109,6 +109,11 @@
       </a:defRPr>
     </a:lvl9pPr>
   </p:defaultTextStyle>
+  <p:extLst>
+    <p:ext uri="{EFAFB233-063F-42B5-8137-9DF3F51BA10A}">
+      <p15:sldGuideLst xmlns:p15="http://schemas.microsoft.com/office/powerpoint/2012/main"/>
+    </p:ext>
+  </p:extLst>
 </p:presentation>
 </file>
 
@@ -194,7 +199,7 @@
           <a:p>
             <a:fld id="{5340897D-FBFB-2B47-B93D-72908C428062}" type="datetimeFigureOut">
               <a:rPr lang="en-US" smtClean="0"/>
-              <a:t>2/24/19</a:t>
+              <a:t>3/3/19</a:t>
             </a:fld>
             <a:endParaRPr lang="en-US"/>
           </a:p>
@@ -692,7 +697,7 @@
           <a:p>
             <a:fld id="{E73CA62D-7A2B-134E-A905-38AC716B5DEB}" type="datetimeFigureOut">
               <a:rPr lang="en-US" smtClean="0"/>
-              <a:t>2/24/19</a:t>
+              <a:t>3/3/19</a:t>
             </a:fld>
             <a:endParaRPr lang="en-US"/>
           </a:p>
@@ -890,7 +895,7 @@
           <a:p>
             <a:fld id="{E73CA62D-7A2B-134E-A905-38AC716B5DEB}" type="datetimeFigureOut">
               <a:rPr lang="en-US" smtClean="0"/>
-              <a:t>2/24/19</a:t>
+              <a:t>3/3/19</a:t>
             </a:fld>
             <a:endParaRPr lang="en-US"/>
           </a:p>
@@ -1098,7 +1103,7 @@
           <a:p>
             <a:fld id="{E73CA62D-7A2B-134E-A905-38AC716B5DEB}" type="datetimeFigureOut">
               <a:rPr lang="en-US" smtClean="0"/>
-              <a:t>2/24/19</a:t>
+              <a:t>3/3/19</a:t>
             </a:fld>
             <a:endParaRPr lang="en-US"/>
           </a:p>
@@ -1296,7 +1301,7 @@
           <a:p>
             <a:fld id="{E73CA62D-7A2B-134E-A905-38AC716B5DEB}" type="datetimeFigureOut">
               <a:rPr lang="en-US" smtClean="0"/>
-              <a:t>2/24/19</a:t>
+              <a:t>3/3/19</a:t>
             </a:fld>
             <a:endParaRPr lang="en-US"/>
           </a:p>
@@ -1571,7 +1576,7 @@
           <a:p>
             <a:fld id="{E73CA62D-7A2B-134E-A905-38AC716B5DEB}" type="datetimeFigureOut">
               <a:rPr lang="en-US" smtClean="0"/>
-              <a:t>2/24/19</a:t>
+              <a:t>3/3/19</a:t>
             </a:fld>
             <a:endParaRPr lang="en-US"/>
           </a:p>
@@ -1836,7 +1841,7 @@
           <a:p>
             <a:fld id="{E73CA62D-7A2B-134E-A905-38AC716B5DEB}" type="datetimeFigureOut">
               <a:rPr lang="en-US" smtClean="0"/>
-              <a:t>2/24/19</a:t>
+              <a:t>3/3/19</a:t>
             </a:fld>
             <a:endParaRPr lang="en-US"/>
           </a:p>
@@ -2248,7 +2253,7 @@
           <a:p>
             <a:fld id="{E73CA62D-7A2B-134E-A905-38AC716B5DEB}" type="datetimeFigureOut">
               <a:rPr lang="en-US" smtClean="0"/>
-              <a:t>2/24/19</a:t>
+              <a:t>3/3/19</a:t>
             </a:fld>
             <a:endParaRPr lang="en-US"/>
           </a:p>
@@ -2389,7 +2394,7 @@
           <a:p>
             <a:fld id="{E73CA62D-7A2B-134E-A905-38AC716B5DEB}" type="datetimeFigureOut">
               <a:rPr lang="en-US" smtClean="0"/>
-              <a:t>2/24/19</a:t>
+              <a:t>3/3/19</a:t>
             </a:fld>
             <a:endParaRPr lang="en-US"/>
           </a:p>
@@ -2502,7 +2507,7 @@
           <a:p>
             <a:fld id="{E73CA62D-7A2B-134E-A905-38AC716B5DEB}" type="datetimeFigureOut">
               <a:rPr lang="en-US" smtClean="0"/>
-              <a:t>2/24/19</a:t>
+              <a:t>3/3/19</a:t>
             </a:fld>
             <a:endParaRPr lang="en-US"/>
           </a:p>
@@ -2813,7 +2818,7 @@
           <a:p>
             <a:fld id="{E73CA62D-7A2B-134E-A905-38AC716B5DEB}" type="datetimeFigureOut">
               <a:rPr lang="en-US" smtClean="0"/>
-              <a:t>2/24/19</a:t>
+              <a:t>3/3/19</a:t>
             </a:fld>
             <a:endParaRPr lang="en-US"/>
           </a:p>
@@ -3101,7 +3106,7 @@
           <a:p>
             <a:fld id="{E73CA62D-7A2B-134E-A905-38AC716B5DEB}" type="datetimeFigureOut">
               <a:rPr lang="en-US" smtClean="0"/>
-              <a:t>2/24/19</a:t>
+              <a:t>3/3/19</a:t>
             </a:fld>
             <a:endParaRPr lang="en-US"/>
           </a:p>
@@ -3342,7 +3347,7 @@
           <a:p>
             <a:fld id="{E73CA62D-7A2B-134E-A905-38AC716B5DEB}" type="datetimeFigureOut">
               <a:rPr lang="en-US" smtClean="0"/>
-              <a:t>2/24/19</a:t>
+              <a:t>3/3/19</a:t>
             </a:fld>
             <a:endParaRPr lang="en-US"/>
           </a:p>
@@ -3824,7 +3829,7 @@
           <p:nvPr>
             <p:extLst>
               <p:ext uri="{D42A27DB-BD31-4B8C-83A1-F6EECF244321}">
-                <p14:modId xmlns:p14="http://schemas.microsoft.com/office/powerpoint/2010/main" val="3625270380"/>
+                <p14:modId xmlns:p14="http://schemas.microsoft.com/office/powerpoint/2010/main" val="1459088987"/>
               </p:ext>
             </p:extLst>
           </p:nvPr>
@@ -3847,14 +3852,14 @@
                     </a:ext>
                   </a:extLst>
                 </a:gridCol>
-                <a:gridCol w="2709333">
+                <a:gridCol w="4083353">
                   <a:extLst>
                     <a:ext uri="{9D8B030D-6E8A-4147-A177-3AD203B41FA5}">
                       <a16:colId xmlns:a16="http://schemas.microsoft.com/office/drawing/2014/main" val="3600996095"/>
                     </a:ext>
                   </a:extLst>
                 </a:gridCol>
-                <a:gridCol w="2709333">
+                <a:gridCol w="1335313">
                   <a:extLst>
                     <a:ext uri="{9D8B030D-6E8A-4147-A177-3AD203B41FA5}">
                       <a16:colId xmlns:a16="http://schemas.microsoft.com/office/drawing/2014/main" val="1156182416"/>
@@ -3929,7 +3934,7 @@
                     <a:p>
                       <a:r>
                         <a:rPr lang="en-US" dirty="0"/>
-                        <a:t>Population size</a:t>
+                        <a:t>Population size (large)</a:t>
                       </a:r>
                     </a:p>
                   </a:txBody>
@@ -3992,7 +3997,7 @@
                     <a:p>
                       <a:r>
                         <a:rPr lang="en-US" dirty="0"/>
-                        <a:t>Selection Pressure</a:t>
+                        <a:t>Selection Pressure (intermediate)</a:t>
                       </a:r>
                     </a:p>
                   </a:txBody>
@@ -4072,7 +4077,7 @@
                       </a:pPr>
                       <a:r>
                         <a:rPr lang="en-US" dirty="0"/>
-                        <a:t>Inherent Noise</a:t>
+                        <a:t>Inherent Noise (low)</a:t>
                       </a:r>
                     </a:p>
                   </a:txBody>
@@ -4172,14 +4177,14 @@
             <p:ph idx="1"/>
             <p:extLst>
               <p:ext uri="{D42A27DB-BD31-4B8C-83A1-F6EECF244321}">
-                <p14:modId xmlns:p14="http://schemas.microsoft.com/office/powerpoint/2010/main" val="1055762033"/>
+                <p14:modId xmlns:p14="http://schemas.microsoft.com/office/powerpoint/2010/main" val="4067065192"/>
               </p:ext>
             </p:extLst>
           </p:nvPr>
         </p:nvGraphicFramePr>
         <p:xfrm>
           <a:off x="561412" y="1778000"/>
-          <a:ext cx="10962932" cy="3302000"/>
+          <a:ext cx="10424160" cy="3291840"/>
         </p:xfrm>
         <a:graphic>
           <a:graphicData uri="http://schemas.openxmlformats.org/drawingml/2006/table">
@@ -4188,42 +4193,42 @@
                 <a:tableStyleId>{5C22544A-7EE6-4342-B048-85BDC9FD1C3A}</a:tableStyleId>
               </a:tblPr>
               <a:tblGrid>
-                <a:gridCol w="1827155">
+                <a:gridCol w="914400">
                   <a:extLst>
                     <a:ext uri="{9D8B030D-6E8A-4147-A177-3AD203B41FA5}">
                       <a16:colId xmlns:a16="http://schemas.microsoft.com/office/drawing/2014/main" val="1961017177"/>
                     </a:ext>
                   </a:extLst>
                 </a:gridCol>
-                <a:gridCol w="1827155">
+                <a:gridCol w="2286000">
                   <a:extLst>
                     <a:ext uri="{9D8B030D-6E8A-4147-A177-3AD203B41FA5}">
                       <a16:colId xmlns:a16="http://schemas.microsoft.com/office/drawing/2014/main" val="3335983684"/>
                     </a:ext>
                   </a:extLst>
                 </a:gridCol>
-                <a:gridCol w="1827155">
+                <a:gridCol w="2286000">
                   <a:extLst>
                     <a:ext uri="{9D8B030D-6E8A-4147-A177-3AD203B41FA5}">
                       <a16:colId xmlns:a16="http://schemas.microsoft.com/office/drawing/2014/main" val="1922321457"/>
                     </a:ext>
                   </a:extLst>
                 </a:gridCol>
-                <a:gridCol w="421344">
+                <a:gridCol w="365760">
                   <a:extLst>
                     <a:ext uri="{9D8B030D-6E8A-4147-A177-3AD203B41FA5}">
                       <a16:colId xmlns:a16="http://schemas.microsoft.com/office/drawing/2014/main" val="3990303433"/>
                     </a:ext>
                   </a:extLst>
                 </a:gridCol>
-                <a:gridCol w="1952224">
+                <a:gridCol w="2286000">
                   <a:extLst>
                     <a:ext uri="{9D8B030D-6E8A-4147-A177-3AD203B41FA5}">
                       <a16:colId xmlns:a16="http://schemas.microsoft.com/office/drawing/2014/main" val="4248734299"/>
                     </a:ext>
                   </a:extLst>
                 </a:gridCol>
-                <a:gridCol w="3107899">
+                <a:gridCol w="2286000">
                   <a:extLst>
                     <a:ext uri="{9D8B030D-6E8A-4147-A177-3AD203B41FA5}">
                       <a16:colId xmlns:a16="http://schemas.microsoft.com/office/drawing/2014/main" val="1732567673"/>
@@ -4231,12 +4236,13 @@
                   </a:extLst>
                 </a:gridCol>
               </a:tblGrid>
-              <a:tr h="370840">
+              <a:tr h="0">
                 <a:tc>
                   <a:txBody>
                     <a:bodyPr/>
                     <a:lstStyle/>
                     <a:p>
+                      <a:pPr algn="ctr"/>
                       <a:endParaRPr lang="en-US" dirty="0"/>
                     </a:p>
                   </a:txBody>
@@ -4247,6 +4253,7 @@
                     <a:bodyPr/>
                     <a:lstStyle/>
                     <a:p>
+                      <a:pPr algn="ctr"/>
                       <a:r>
                         <a:rPr lang="en-US" dirty="0"/>
                         <a:t>1CC</a:t>
@@ -4260,6 +4267,7 @@
                     <a:bodyPr/>
                     <a:lstStyle/>
                     <a:p>
+                      <a:pPr algn="ctr"/>
                       <a:r>
                         <a:rPr lang="en-US" dirty="0"/>
                         <a:t>1CD</a:t>
@@ -4273,10 +4281,24 @@
                     <a:bodyPr/>
                     <a:lstStyle/>
                     <a:p>
+                      <a:pPr algn="ctr"/>
                       <a:r>
-                        <a:rPr lang="en-US" dirty="0"/>
-                        <a:t>…</a:t>
+                        <a:rPr lang="es-ES" sz="1800" b="1" kern="1200" dirty="0">
+                          <a:solidFill>
+                            <a:schemeClr val="bg1"/>
+                          </a:solidFill>
+                          <a:effectLst/>
+                          <a:latin typeface="+mn-lt"/>
+                          <a:ea typeface="+mn-ea"/>
+                          <a:cs typeface="+mn-cs"/>
+                        </a:rPr>
+                        <a:t>⋯</a:t>
                       </a:r>
+                      <a:endParaRPr lang="en-US" dirty="0">
+                        <a:solidFill>
+                          <a:schemeClr val="bg1"/>
+                        </a:solidFill>
+                      </a:endParaRPr>
                     </a:p>
                   </a:txBody>
                   <a:tcPr/>
@@ -4286,6 +4308,7 @@
                     <a:bodyPr/>
                     <a:lstStyle/>
                     <a:p>
+                      <a:pPr algn="ctr"/>
                       <a:r>
                         <a:rPr lang="en-US" dirty="0"/>
                         <a:t>2DC</a:t>
@@ -4299,6 +4322,7 @@
                     <a:bodyPr/>
                     <a:lstStyle/>
                     <a:p>
+                      <a:pPr algn="ctr"/>
                       <a:r>
                         <a:rPr lang="en-US" dirty="0"/>
                         <a:t>2DD</a:t>
@@ -4313,12 +4337,13 @@
                   </a:ext>
                 </a:extLst>
               </a:tr>
-              <a:tr h="370840">
+              <a:tr h="0">
                 <a:tc>
                   <a:txBody>
                     <a:bodyPr/>
                     <a:lstStyle/>
                     <a:p>
+                      <a:pPr algn="ctr"/>
                       <a:r>
                         <a:rPr lang="en-US" dirty="0"/>
                         <a:t>1CC</a:t>
@@ -4332,8 +4357,9 @@
                     <a:bodyPr/>
                     <a:lstStyle/>
                     <a:p>
+                      <a:pPr algn="ctr"/>
                       <a:r>
-                        <a:rPr lang="en-US" dirty="0">
+                        <a:rPr lang="en-US" b="1" dirty="0">
                           <a:solidFill>
                             <a:srgbClr val="FF0000"/>
                           </a:solidFill>
@@ -4341,7 +4367,7 @@
                         <a:t>f(x1cc, y1cc) </a:t>
                       </a:r>
                       <a:br>
-                        <a:rPr lang="en-US" dirty="0">
+                        <a:rPr lang="en-US" b="1" dirty="0">
                           <a:solidFill>
                             <a:srgbClr val="FF0000"/>
                           </a:solidFill>
@@ -4349,7 +4375,7 @@
                       </a:br>
                       <a:r>
                         <a:rPr lang="en-US" b="1" dirty="0"/>
-                        <a:t>* p1cc * q1cc</a:t>
+                        <a:t>·p1cc·q1cc</a:t>
                       </a:r>
                     </a:p>
                   </a:txBody>
@@ -4360,8 +4386,9 @@
                     <a:bodyPr/>
                     <a:lstStyle/>
                     <a:p>
+                      <a:pPr algn="ctr"/>
                       <a:r>
-                        <a:rPr lang="es-ES" sz="1800" kern="1200" dirty="0">
+                        <a:rPr lang="es-ES" sz="1800" b="1" kern="1200" dirty="0">
                           <a:solidFill>
                             <a:srgbClr val="FF0000"/>
                           </a:solidFill>
@@ -4370,22 +4397,11 @@
                           <a:ea typeface="+mn-ea"/>
                           <a:cs typeface="+mn-cs"/>
                         </a:rPr>
-                        <a:t>f(x1cc, y1cc</a:t>
-                      </a:r>
-                      <a:r>
-                        <a:rPr lang="es-ES" sz="1800" kern="1200" dirty="0">
-                          <a:solidFill>
-                            <a:schemeClr val="dk1"/>
-                          </a:solidFill>
-                          <a:effectLst/>
-                          <a:latin typeface="+mn-lt"/>
-                          <a:ea typeface="+mn-ea"/>
-                          <a:cs typeface="+mn-cs"/>
-                        </a:rPr>
-                        <a:t>)</a:t>
+                        <a:t>f(x1cc, y1cc)</a:t>
                       </a:r>
                     </a:p>
                     <a:p>
+                      <a:pPr algn="ctr"/>
                       <a:r>
                         <a:rPr lang="es-ES" sz="1800" b="1" kern="1200" dirty="0">
                           <a:solidFill>
@@ -4396,7 +4412,7 @@
                           <a:ea typeface="+mn-ea"/>
                           <a:cs typeface="+mn-cs"/>
                         </a:rPr>
-                        <a:t>*p1cc*(1 - q1cc)</a:t>
+                        <a:t>·p1cc·(1 - q1cc)</a:t>
                       </a:r>
                     </a:p>
                   </a:txBody>
@@ -4407,7 +4423,8 @@
                     <a:bodyPr/>
                     <a:lstStyle/>
                     <a:p>
-                      <a:endParaRPr lang="en-US" dirty="0"/>
+                      <a:pPr algn="ctr"/>
+                      <a:endParaRPr lang="en-US" b="1" dirty="0"/>
                     </a:p>
                   </a:txBody>
                   <a:tcPr/>
@@ -4417,10 +4434,11 @@
                     <a:bodyPr/>
                     <a:lstStyle/>
                     <a:p>
+                      <a:pPr algn="ctr"/>
                       <a:r>
-                        <a:rPr lang="es-ES" sz="1800" kern="1200" dirty="0">
+                        <a:rPr lang="es-ES" sz="1800" b="1" kern="1200" dirty="0">
                           <a:solidFill>
-                            <a:schemeClr val="accent2"/>
+                            <a:srgbClr val="FF0000"/>
                           </a:solidFill>
                           <a:effectLst/>
                           <a:latin typeface="+mn-lt"/>
@@ -4431,6 +4449,19 @@
                       </a:r>
                     </a:p>
                     <a:p>
+                      <a:pPr algn="ctr"/>
+                      <a:r>
+                        <a:rPr lang="es-ES" sz="1800" b="1" kern="1200" dirty="0">
+                          <a:solidFill>
+                            <a:schemeClr val="tx1"/>
+                          </a:solidFill>
+                          <a:effectLst/>
+                          <a:latin typeface="+mn-lt"/>
+                          <a:ea typeface="+mn-ea"/>
+                          <a:cs typeface="+mn-cs"/>
+                        </a:rPr>
+                        <a:t>·</a:t>
+                      </a:r>
                       <a:r>
                         <a:rPr lang="es-ES" sz="1800" b="1" kern="1200" dirty="0">
                           <a:solidFill>
@@ -4441,7 +4472,7 @@
                           <a:ea typeface="+mn-ea"/>
                           <a:cs typeface="+mn-cs"/>
                         </a:rPr>
-                        <a:t>* (1 - p2cc)*q2cc</a:t>
+                        <a:t>(1 - p2cc)·q2cc</a:t>
                       </a:r>
                     </a:p>
                   </a:txBody>
@@ -4452,10 +4483,11 @@
                     <a:bodyPr/>
                     <a:lstStyle/>
                     <a:p>
+                      <a:pPr algn="ctr"/>
                       <a:r>
-                        <a:rPr lang="es-ES" sz="1800" kern="1200" dirty="0">
+                        <a:rPr lang="es-ES" sz="1800" b="1" kern="1200" dirty="0">
                           <a:solidFill>
-                            <a:schemeClr val="accent2"/>
+                            <a:srgbClr val="FF0000"/>
                           </a:solidFill>
                           <a:effectLst/>
                           <a:latin typeface="+mn-lt"/>
@@ -4466,6 +4498,7 @@
                       </a:r>
                     </a:p>
                     <a:p>
+                      <a:pPr algn="ctr"/>
                       <a:r>
                         <a:rPr lang="es-ES" sz="1800" b="1" kern="1200" dirty="0">
                           <a:solidFill>
@@ -4476,7 +4509,7 @@
                           <a:ea typeface="+mn-ea"/>
                           <a:cs typeface="+mn-cs"/>
                         </a:rPr>
-                        <a:t>* (1 - p2cc)* (1 - q2cc)</a:t>
+                        <a:t>·(1 - p2cc)·(1 - q2cc)</a:t>
                       </a:r>
                     </a:p>
                   </a:txBody>
@@ -4488,12 +4521,13 @@
                   </a:ext>
                 </a:extLst>
               </a:tr>
-              <a:tr h="370840">
+              <a:tr h="0">
                 <a:tc>
                   <a:txBody>
                     <a:bodyPr/>
                     <a:lstStyle/>
                     <a:p>
+                      <a:pPr algn="ctr"/>
                       <a:r>
                         <a:rPr lang="en-US" dirty="0"/>
                         <a:t>1CD</a:t>
@@ -4507,7 +4541,7 @@
                     <a:bodyPr/>
                     <a:lstStyle/>
                     <a:p>
-                      <a:pPr marL="0" marR="0" lvl="0" indent="0" algn="l" defTabSz="914400" rtl="0" eaLnBrk="1" fontAlgn="auto" latinLnBrk="0" hangingPunct="1">
+                      <a:pPr marL="0" marR="0" lvl="0" indent="0" algn="ctr" defTabSz="914400" rtl="0" eaLnBrk="1" fontAlgn="auto" latinLnBrk="0" hangingPunct="1">
                         <a:lnSpc>
                           <a:spcPct val="100000"/>
                         </a:lnSpc>
@@ -4525,7 +4559,7 @@
                         <a:defRPr/>
                       </a:pPr>
                       <a:r>
-                        <a:rPr lang="es-ES" sz="1800" kern="1200" dirty="0">
+                        <a:rPr lang="es-ES" sz="1800" b="1" kern="1200" dirty="0">
                           <a:solidFill>
                             <a:srgbClr val="FF0000"/>
                           </a:solidFill>
@@ -4538,7 +4572,7 @@
                       </a:r>
                     </a:p>
                     <a:p>
-                      <a:pPr marL="0" marR="0" lvl="0" indent="0" algn="l" defTabSz="914400" rtl="0" eaLnBrk="1" fontAlgn="auto" latinLnBrk="0" hangingPunct="1">
+                      <a:pPr marL="0" marR="0" lvl="0" indent="0" algn="ctr" defTabSz="914400" rtl="0" eaLnBrk="1" fontAlgn="auto" latinLnBrk="0" hangingPunct="1">
                         <a:lnSpc>
                           <a:spcPct val="100000"/>
                         </a:lnSpc>
@@ -4565,7 +4599,7 @@
                           <a:ea typeface="+mn-ea"/>
                           <a:cs typeface="+mn-cs"/>
                         </a:rPr>
-                        <a:t>*p1cd*q1dc</a:t>
+                        <a:t>·p1cd·q1dc</a:t>
                       </a:r>
                     </a:p>
                   </a:txBody>
@@ -4576,7 +4610,7 @@
                     <a:bodyPr/>
                     <a:lstStyle/>
                     <a:p>
-                      <a:pPr marL="0" marR="0" lvl="0" indent="0" algn="l" defTabSz="914400" rtl="0" eaLnBrk="1" fontAlgn="auto" latinLnBrk="0" hangingPunct="1">
+                      <a:pPr marL="0" marR="0" lvl="0" indent="0" algn="ctr" defTabSz="914400" rtl="0" eaLnBrk="1" fontAlgn="auto" latinLnBrk="0" hangingPunct="1">
                         <a:lnSpc>
                           <a:spcPct val="100000"/>
                         </a:lnSpc>
@@ -4594,7 +4628,7 @@
                         <a:defRPr/>
                       </a:pPr>
                       <a:r>
-                        <a:rPr lang="es-ES" sz="1800" kern="1200" dirty="0">
+                        <a:rPr lang="es-ES" sz="1800" b="1" kern="1200" dirty="0">
                           <a:solidFill>
                             <a:srgbClr val="FF0000"/>
                           </a:solidFill>
@@ -4607,7 +4641,7 @@
                       </a:r>
                     </a:p>
                     <a:p>
-                      <a:pPr marL="0" marR="0" lvl="0" indent="0" algn="l" defTabSz="914400" rtl="0" eaLnBrk="1" fontAlgn="auto" latinLnBrk="0" hangingPunct="1">
+                      <a:pPr marL="0" marR="0" lvl="0" indent="0" algn="ctr" defTabSz="914400" rtl="0" eaLnBrk="1" fontAlgn="auto" latinLnBrk="0" hangingPunct="1">
                         <a:lnSpc>
                           <a:spcPct val="100000"/>
                         </a:lnSpc>
@@ -4634,7 +4668,7 @@
                           <a:ea typeface="+mn-ea"/>
                           <a:cs typeface="+mn-cs"/>
                         </a:rPr>
-                        <a:t>*p1cd*(1 - q1dc)</a:t>
+                        <a:t>·p1cd·(1 - q1dc)</a:t>
                       </a:r>
                     </a:p>
                   </a:txBody>
@@ -4645,7 +4679,8 @@
                     <a:bodyPr/>
                     <a:lstStyle/>
                     <a:p>
-                      <a:endParaRPr lang="en-US" dirty="0"/>
+                      <a:pPr algn="ctr"/>
+                      <a:endParaRPr lang="en-US" b="1" dirty="0"/>
                     </a:p>
                   </a:txBody>
                   <a:tcPr/>
@@ -4655,7 +4690,7 @@
                     <a:bodyPr/>
                     <a:lstStyle/>
                     <a:p>
-                      <a:pPr marL="0" marR="0" lvl="0" indent="0" algn="l" defTabSz="914400" rtl="0" eaLnBrk="1" fontAlgn="auto" latinLnBrk="0" hangingPunct="1">
+                      <a:pPr marL="0" marR="0" lvl="0" indent="0" algn="ctr" defTabSz="914400" rtl="0" eaLnBrk="1" fontAlgn="auto" latinLnBrk="0" hangingPunct="1">
                         <a:lnSpc>
                           <a:spcPct val="100000"/>
                         </a:lnSpc>
@@ -4673,9 +4708,9 @@
                         <a:defRPr/>
                       </a:pPr>
                       <a:r>
-                        <a:rPr lang="es-ES" sz="1800" kern="1200" dirty="0">
+                        <a:rPr lang="es-ES" sz="1800" b="1" kern="1200" dirty="0">
                           <a:solidFill>
-                            <a:schemeClr val="accent2"/>
+                            <a:srgbClr val="FF0000"/>
                           </a:solidFill>
                           <a:effectLst/>
                           <a:latin typeface="+mn-lt"/>
@@ -4686,7 +4721,7 @@
                       </a:r>
                     </a:p>
                     <a:p>
-                      <a:pPr marL="0" marR="0" lvl="0" indent="0" algn="l" defTabSz="914400" rtl="0" eaLnBrk="1" fontAlgn="auto" latinLnBrk="0" hangingPunct="1">
+                      <a:pPr marL="0" marR="0" lvl="0" indent="0" algn="ctr" defTabSz="914400" rtl="0" eaLnBrk="1" fontAlgn="auto" latinLnBrk="0" hangingPunct="1">
                         <a:lnSpc>
                           <a:spcPct val="100000"/>
                         </a:lnSpc>
@@ -4713,7 +4748,7 @@
                           <a:ea typeface="+mn-ea"/>
                           <a:cs typeface="+mn-cs"/>
                         </a:rPr>
-                        <a:t>*(1 - p2cd)*q2dc</a:t>
+                        <a:t>·(1 - p2cd)·q2dc</a:t>
                       </a:r>
                     </a:p>
                   </a:txBody>
@@ -4724,7 +4759,7 @@
                     <a:bodyPr/>
                     <a:lstStyle/>
                     <a:p>
-                      <a:pPr marL="0" marR="0" lvl="0" indent="0" algn="l" defTabSz="914400" rtl="0" eaLnBrk="1" fontAlgn="auto" latinLnBrk="0" hangingPunct="1">
+                      <a:pPr marL="0" marR="0" lvl="0" indent="0" algn="ctr" defTabSz="914400" rtl="0" eaLnBrk="1" fontAlgn="auto" latinLnBrk="0" hangingPunct="1">
                         <a:lnSpc>
                           <a:spcPct val="100000"/>
                         </a:lnSpc>
@@ -4742,9 +4777,9 @@
                         <a:defRPr/>
                       </a:pPr>
                       <a:r>
-                        <a:rPr lang="es-ES" sz="1800" kern="1200" dirty="0">
+                        <a:rPr lang="es-ES" sz="1800" b="1" kern="1200" dirty="0">
                           <a:solidFill>
-                            <a:schemeClr val="accent2"/>
+                            <a:srgbClr val="FF0000"/>
                           </a:solidFill>
                           <a:effectLst/>
                           <a:latin typeface="+mn-lt"/>
@@ -4755,7 +4790,7 @@
                       </a:r>
                     </a:p>
                     <a:p>
-                      <a:pPr marL="0" marR="0" lvl="0" indent="0" algn="l" defTabSz="914400" rtl="0" eaLnBrk="1" fontAlgn="auto" latinLnBrk="0" hangingPunct="1">
+                      <a:pPr marL="0" marR="0" lvl="0" indent="0" algn="ctr" defTabSz="914400" rtl="0" eaLnBrk="1" fontAlgn="auto" latinLnBrk="0" hangingPunct="1">
                         <a:lnSpc>
                           <a:spcPct val="100000"/>
                         </a:lnSpc>
@@ -4782,7 +4817,7 @@
                           <a:ea typeface="+mn-ea"/>
                           <a:cs typeface="+mn-cs"/>
                         </a:rPr>
-                        <a:t>*(1 - p2cd)*(1 - q2dc)</a:t>
+                        <a:t>·(1 - p2cd)·(1 - q2dc)</a:t>
                       </a:r>
                     </a:p>
                   </a:txBody>
@@ -4794,15 +4829,16 @@
                   </a:ext>
                 </a:extLst>
               </a:tr>
-              <a:tr h="370840">
+              <a:tr h="274320">
                 <a:tc>
                   <a:txBody>
                     <a:bodyPr/>
                     <a:lstStyle/>
                     <a:p>
+                      <a:pPr algn="ctr"/>
                       <a:r>
                         <a:rPr lang="en-US" dirty="0"/>
-                        <a:t>   ⋮</a:t>
+                        <a:t>⋮</a:t>
                       </a:r>
                     </a:p>
                   </a:txBody>
@@ -4813,7 +4849,8 @@
                     <a:bodyPr/>
                     <a:lstStyle/>
                     <a:p>
-                      <a:endParaRPr lang="en-US" dirty="0"/>
+                      <a:pPr algn="ctr"/>
+                      <a:endParaRPr lang="en-US" b="1" dirty="0"/>
                     </a:p>
                   </a:txBody>
                   <a:tcPr/>
@@ -4823,7 +4860,8 @@
                     <a:bodyPr/>
                     <a:lstStyle/>
                     <a:p>
-                      <a:endParaRPr lang="en-US" dirty="0"/>
+                      <a:pPr algn="ctr"/>
+                      <a:endParaRPr lang="en-US" b="1" dirty="0"/>
                     </a:p>
                   </a:txBody>
                   <a:tcPr/>
@@ -4833,7 +4871,8 @@
                     <a:bodyPr/>
                     <a:lstStyle/>
                     <a:p>
-                      <a:endParaRPr lang="en-US" dirty="0"/>
+                      <a:pPr algn="ctr"/>
+                      <a:endParaRPr lang="en-US" b="1" dirty="0"/>
                     </a:p>
                   </a:txBody>
                   <a:tcPr/>
@@ -4843,7 +4882,8 @@
                     <a:bodyPr/>
                     <a:lstStyle/>
                     <a:p>
-                      <a:endParaRPr lang="en-US" dirty="0"/>
+                      <a:pPr algn="ctr"/>
+                      <a:endParaRPr lang="en-US" b="1" dirty="0"/>
                     </a:p>
                   </a:txBody>
                   <a:tcPr/>
@@ -4853,7 +4893,8 @@
                     <a:bodyPr/>
                     <a:lstStyle/>
                     <a:p>
-                      <a:endParaRPr lang="en-US" dirty="0"/>
+                      <a:pPr algn="ctr"/>
+                      <a:endParaRPr lang="en-US" b="1" dirty="0"/>
                     </a:p>
                   </a:txBody>
                   <a:tcPr/>
@@ -4864,12 +4905,13 @@
                   </a:ext>
                 </a:extLst>
               </a:tr>
-              <a:tr h="370840">
+              <a:tr h="0">
                 <a:tc>
                   <a:txBody>
                     <a:bodyPr/>
                     <a:lstStyle/>
                     <a:p>
+                      <a:pPr algn="ctr"/>
                       <a:r>
                         <a:rPr lang="en-US" dirty="0"/>
                         <a:t>2DC</a:t>
@@ -4883,7 +4925,7 @@
                     <a:bodyPr/>
                     <a:lstStyle/>
                     <a:p>
-                      <a:pPr marL="0" marR="0" lvl="0" indent="0" algn="l" defTabSz="914400" rtl="0" eaLnBrk="1" fontAlgn="auto" latinLnBrk="0" hangingPunct="1">
+                      <a:pPr marL="0" marR="0" lvl="0" indent="0" algn="ctr" defTabSz="914400" rtl="0" eaLnBrk="1" fontAlgn="auto" latinLnBrk="0" hangingPunct="1">
                         <a:lnSpc>
                           <a:spcPct val="100000"/>
                         </a:lnSpc>
@@ -4901,7 +4943,7 @@
                         <a:defRPr/>
                       </a:pPr>
                       <a:r>
-                        <a:rPr lang="es-ES" sz="1800" kern="1200" dirty="0">
+                        <a:rPr lang="es-ES" sz="1800" b="1" kern="1200" dirty="0">
                           <a:solidFill>
                             <a:srgbClr val="FF0000"/>
                           </a:solidFill>
@@ -4914,7 +4956,7 @@
                       </a:r>
                     </a:p>
                     <a:p>
-                      <a:pPr marL="0" marR="0" lvl="0" indent="0" algn="l" defTabSz="914400" rtl="0" eaLnBrk="1" fontAlgn="auto" latinLnBrk="0" hangingPunct="1">
+                      <a:pPr marL="0" marR="0" lvl="0" indent="0" algn="ctr" defTabSz="914400" rtl="0" eaLnBrk="1" fontAlgn="auto" latinLnBrk="0" hangingPunct="1">
                         <a:lnSpc>
                           <a:spcPct val="100000"/>
                         </a:lnSpc>
@@ -4941,7 +4983,7 @@
                           <a:ea typeface="+mn-ea"/>
                           <a:cs typeface="+mn-cs"/>
                         </a:rPr>
-                        <a:t>*p1dc*q1cd</a:t>
+                        <a:t>·p1dc·q1cd</a:t>
                       </a:r>
                     </a:p>
                   </a:txBody>
@@ -4952,7 +4994,7 @@
                     <a:bodyPr/>
                     <a:lstStyle/>
                     <a:p>
-                      <a:pPr marL="0" marR="0" lvl="0" indent="0" algn="l" defTabSz="914400" rtl="0" eaLnBrk="1" fontAlgn="auto" latinLnBrk="0" hangingPunct="1">
+                      <a:pPr marL="0" marR="0" lvl="0" indent="0" algn="ctr" defTabSz="914400" rtl="0" eaLnBrk="1" fontAlgn="auto" latinLnBrk="0" hangingPunct="1">
                         <a:lnSpc>
                           <a:spcPct val="100000"/>
                         </a:lnSpc>
@@ -4970,7 +5012,7 @@
                         <a:defRPr/>
                       </a:pPr>
                       <a:r>
-                        <a:rPr lang="es-ES" sz="1800" kern="1200" dirty="0">
+                        <a:rPr lang="es-ES" sz="1800" b="1" kern="1200" dirty="0">
                           <a:solidFill>
                             <a:srgbClr val="FF0000"/>
                           </a:solidFill>
@@ -4983,7 +5025,7 @@
                       </a:r>
                     </a:p>
                     <a:p>
-                      <a:pPr marL="0" marR="0" lvl="0" indent="0" algn="l" defTabSz="914400" rtl="0" eaLnBrk="1" fontAlgn="auto" latinLnBrk="0" hangingPunct="1">
+                      <a:pPr marL="0" marR="0" lvl="0" indent="0" algn="ctr" defTabSz="914400" rtl="0" eaLnBrk="1" fontAlgn="auto" latinLnBrk="0" hangingPunct="1">
                         <a:lnSpc>
                           <a:spcPct val="100000"/>
                         </a:lnSpc>
@@ -5010,7 +5052,7 @@
                           <a:ea typeface="+mn-ea"/>
                           <a:cs typeface="+mn-cs"/>
                         </a:rPr>
-                        <a:t>*p1dc*(1 - q1cd)</a:t>
+                        <a:t>·p1dc·(1 - q1cd)</a:t>
                       </a:r>
                     </a:p>
                   </a:txBody>
@@ -5021,7 +5063,8 @@
                     <a:bodyPr/>
                     <a:lstStyle/>
                     <a:p>
-                      <a:endParaRPr lang="en-US" dirty="0"/>
+                      <a:pPr algn="ctr"/>
+                      <a:endParaRPr lang="en-US" b="1" dirty="0"/>
                     </a:p>
                   </a:txBody>
                   <a:tcPr/>
@@ -5031,7 +5074,7 @@
                     <a:bodyPr/>
                     <a:lstStyle/>
                     <a:p>
-                      <a:pPr marL="0" marR="0" lvl="0" indent="0" algn="l" defTabSz="914400" rtl="0" eaLnBrk="1" fontAlgn="auto" latinLnBrk="0" hangingPunct="1">
+                      <a:pPr marL="0" marR="0" lvl="0" indent="0" algn="ctr" defTabSz="914400" rtl="0" eaLnBrk="1" fontAlgn="auto" latinLnBrk="0" hangingPunct="1">
                         <a:lnSpc>
                           <a:spcPct val="100000"/>
                         </a:lnSpc>
@@ -5049,9 +5092,9 @@
                         <a:defRPr/>
                       </a:pPr>
                       <a:r>
-                        <a:rPr lang="es-ES" sz="1800" kern="1200" dirty="0">
+                        <a:rPr lang="es-ES" sz="1800" b="1" kern="1200" dirty="0">
                           <a:solidFill>
-                            <a:schemeClr val="accent2"/>
+                            <a:srgbClr val="FF0000"/>
                           </a:solidFill>
                           <a:effectLst/>
                           <a:latin typeface="+mn-lt"/>
@@ -5062,7 +5105,7 @@
                       </a:r>
                     </a:p>
                     <a:p>
-                      <a:pPr marL="0" marR="0" lvl="0" indent="0" algn="l" defTabSz="914400" rtl="0" eaLnBrk="1" fontAlgn="auto" latinLnBrk="0" hangingPunct="1">
+                      <a:pPr marL="0" marR="0" lvl="0" indent="0" algn="ctr" defTabSz="914400" rtl="0" eaLnBrk="1" fontAlgn="auto" latinLnBrk="0" hangingPunct="1">
                         <a:lnSpc>
                           <a:spcPct val="100000"/>
                         </a:lnSpc>
@@ -5089,7 +5132,7 @@
                           <a:ea typeface="+mn-ea"/>
                           <a:cs typeface="+mn-cs"/>
                         </a:rPr>
-                        <a:t>*(1 - p2dc)* q2cd</a:t>
+                        <a:t>·(1 - p2dc)·q2cd</a:t>
                       </a:r>
                     </a:p>
                   </a:txBody>
@@ -5100,7 +5143,7 @@
                     <a:bodyPr/>
                     <a:lstStyle/>
                     <a:p>
-                      <a:pPr marL="0" marR="0" lvl="0" indent="0" algn="l" defTabSz="914400" rtl="0" eaLnBrk="1" fontAlgn="auto" latinLnBrk="0" hangingPunct="1">
+                      <a:pPr marL="0" marR="0" lvl="0" indent="0" algn="ctr" defTabSz="914400" rtl="0" eaLnBrk="1" fontAlgn="auto" latinLnBrk="0" hangingPunct="1">
                         <a:lnSpc>
                           <a:spcPct val="100000"/>
                         </a:lnSpc>
@@ -5118,9 +5161,9 @@
                         <a:defRPr/>
                       </a:pPr>
                       <a:r>
-                        <a:rPr lang="es-ES" sz="1800" kern="1200" dirty="0">
+                        <a:rPr lang="es-ES" sz="1800" b="1" kern="1200" dirty="0">
                           <a:solidFill>
-                            <a:schemeClr val="accent2"/>
+                            <a:srgbClr val="FF0000"/>
                           </a:solidFill>
                           <a:effectLst/>
                           <a:latin typeface="+mn-lt"/>
@@ -5131,7 +5174,7 @@
                       </a:r>
                     </a:p>
                     <a:p>
-                      <a:pPr marL="0" marR="0" lvl="0" indent="0" algn="l" defTabSz="914400" rtl="0" eaLnBrk="1" fontAlgn="auto" latinLnBrk="0" hangingPunct="1">
+                      <a:pPr marL="0" marR="0" lvl="0" indent="0" algn="ctr" defTabSz="914400" rtl="0" eaLnBrk="1" fontAlgn="auto" latinLnBrk="0" hangingPunct="1">
                         <a:lnSpc>
                           <a:spcPct val="100000"/>
                         </a:lnSpc>
@@ -5158,7 +5201,7 @@
                           <a:ea typeface="+mn-ea"/>
                           <a:cs typeface="+mn-cs"/>
                         </a:rPr>
-                        <a:t>*(1 - p2dc)*(1 - q2cd)</a:t>
+                        <a:t>·(1 - p2dc)·(1 - q2cd)</a:t>
                       </a:r>
                     </a:p>
                   </a:txBody>
@@ -5170,12 +5213,13 @@
                   </a:ext>
                 </a:extLst>
               </a:tr>
-              <a:tr h="370840">
+              <a:tr h="0">
                 <a:tc>
                   <a:txBody>
                     <a:bodyPr/>
                     <a:lstStyle/>
                     <a:p>
+                      <a:pPr algn="ctr"/>
                       <a:r>
                         <a:rPr lang="en-US" dirty="0"/>
                         <a:t>2DD</a:t>
@@ -5189,7 +5233,7 @@
                     <a:bodyPr/>
                     <a:lstStyle/>
                     <a:p>
-                      <a:pPr marL="0" marR="0" lvl="0" indent="0" algn="l" defTabSz="914400" rtl="0" eaLnBrk="1" fontAlgn="auto" latinLnBrk="0" hangingPunct="1">
+                      <a:pPr marL="0" marR="0" lvl="0" indent="0" algn="ctr" defTabSz="914400" rtl="0" eaLnBrk="1" fontAlgn="auto" latinLnBrk="0" hangingPunct="1">
                         <a:lnSpc>
                           <a:spcPct val="100000"/>
                         </a:lnSpc>
@@ -5207,7 +5251,7 @@
                         <a:defRPr/>
                       </a:pPr>
                       <a:r>
-                        <a:rPr lang="es-ES" sz="1800" kern="1200" dirty="0">
+                        <a:rPr lang="es-ES" sz="1800" b="1" kern="1200" dirty="0">
                           <a:solidFill>
                             <a:srgbClr val="FF0000"/>
                           </a:solidFill>
@@ -5220,7 +5264,7 @@
                       </a:r>
                     </a:p>
                     <a:p>
-                      <a:pPr marL="0" marR="0" lvl="0" indent="0" algn="l" defTabSz="914400" rtl="0" eaLnBrk="1" fontAlgn="auto" latinLnBrk="0" hangingPunct="1">
+                      <a:pPr marL="0" marR="0" lvl="0" indent="0" algn="ctr" defTabSz="914400" rtl="0" eaLnBrk="1" fontAlgn="auto" latinLnBrk="0" hangingPunct="1">
                         <a:lnSpc>
                           <a:spcPct val="100000"/>
                         </a:lnSpc>
@@ -5247,7 +5291,7 @@
                           <a:ea typeface="+mn-ea"/>
                           <a:cs typeface="+mn-cs"/>
                         </a:rPr>
-                        <a:t>*p1dd*q1dd</a:t>
+                        <a:t>·p1dd·q1dd</a:t>
                       </a:r>
                     </a:p>
                   </a:txBody>
@@ -5258,7 +5302,7 @@
                     <a:bodyPr/>
                     <a:lstStyle/>
                     <a:p>
-                      <a:pPr marL="0" marR="0" lvl="0" indent="0" algn="l" defTabSz="914400" rtl="0" eaLnBrk="1" fontAlgn="auto" latinLnBrk="0" hangingPunct="1">
+                      <a:pPr marL="0" marR="0" lvl="0" indent="0" algn="ctr" defTabSz="914400" rtl="0" eaLnBrk="1" fontAlgn="auto" latinLnBrk="0" hangingPunct="1">
                         <a:lnSpc>
                           <a:spcPct val="100000"/>
                         </a:lnSpc>
@@ -5276,7 +5320,7 @@
                         <a:defRPr/>
                       </a:pPr>
                       <a:r>
-                        <a:rPr lang="es-ES" sz="1800" kern="1200" dirty="0">
+                        <a:rPr lang="es-ES" sz="1800" b="1" kern="1200" dirty="0">
                           <a:solidFill>
                             <a:srgbClr val="FF0000"/>
                           </a:solidFill>
@@ -5289,7 +5333,7 @@
                       </a:r>
                     </a:p>
                     <a:p>
-                      <a:pPr marL="0" marR="0" lvl="0" indent="0" algn="l" defTabSz="914400" rtl="0" eaLnBrk="1" fontAlgn="auto" latinLnBrk="0" hangingPunct="1">
+                      <a:pPr marL="0" marR="0" lvl="0" indent="0" algn="ctr" defTabSz="914400" rtl="0" eaLnBrk="1" fontAlgn="auto" latinLnBrk="0" hangingPunct="1">
                         <a:lnSpc>
                           <a:spcPct val="100000"/>
                         </a:lnSpc>
@@ -5316,7 +5360,7 @@
                           <a:ea typeface="+mn-ea"/>
                           <a:cs typeface="+mn-cs"/>
                         </a:rPr>
-                        <a:t>*p1dd*(1 - q1dd)</a:t>
+                        <a:t>·p1dd·(1 - q1dd)</a:t>
                       </a:r>
                     </a:p>
                   </a:txBody>
@@ -5327,7 +5371,8 @@
                     <a:bodyPr/>
                     <a:lstStyle/>
                     <a:p>
-                      <a:endParaRPr lang="en-US" dirty="0"/>
+                      <a:pPr algn="ctr"/>
+                      <a:endParaRPr lang="en-US" b="1" dirty="0"/>
                     </a:p>
                   </a:txBody>
                   <a:tcPr/>
@@ -5337,7 +5382,7 @@
                     <a:bodyPr/>
                     <a:lstStyle/>
                     <a:p>
-                      <a:pPr marL="0" marR="0" lvl="0" indent="0" algn="l" defTabSz="914400" rtl="0" eaLnBrk="1" fontAlgn="auto" latinLnBrk="0" hangingPunct="1">
+                      <a:pPr marL="0" marR="0" lvl="0" indent="0" algn="ctr" defTabSz="914400" rtl="0" eaLnBrk="1" fontAlgn="auto" latinLnBrk="0" hangingPunct="1">
                         <a:lnSpc>
                           <a:spcPct val="100000"/>
                         </a:lnSpc>
@@ -5355,9 +5400,9 @@
                         <a:defRPr/>
                       </a:pPr>
                       <a:r>
-                        <a:rPr lang="es-ES" sz="1800" kern="1200" dirty="0">
+                        <a:rPr lang="es-ES" sz="1800" b="1" kern="1200" dirty="0">
                           <a:solidFill>
-                            <a:schemeClr val="accent2"/>
+                            <a:srgbClr val="FF0000"/>
                           </a:solidFill>
                           <a:effectLst/>
                           <a:latin typeface="+mn-lt"/>
@@ -5368,7 +5413,7 @@
                       </a:r>
                     </a:p>
                     <a:p>
-                      <a:pPr marL="0" marR="0" lvl="0" indent="0" algn="l" defTabSz="914400" rtl="0" eaLnBrk="1" fontAlgn="auto" latinLnBrk="0" hangingPunct="1">
+                      <a:pPr marL="0" marR="0" lvl="0" indent="0" algn="ctr" defTabSz="914400" rtl="0" eaLnBrk="1" fontAlgn="auto" latinLnBrk="0" hangingPunct="1">
                         <a:lnSpc>
                           <a:spcPct val="100000"/>
                         </a:lnSpc>
@@ -5395,7 +5440,7 @@
                           <a:ea typeface="+mn-ea"/>
                           <a:cs typeface="+mn-cs"/>
                         </a:rPr>
-                        <a:t>*(1 - p2dd)*q2dd</a:t>
+                        <a:t>·(1 - p2dd)·q2dd</a:t>
                       </a:r>
                     </a:p>
                   </a:txBody>
@@ -5406,7 +5451,7 @@
                     <a:bodyPr/>
                     <a:lstStyle/>
                     <a:p>
-                      <a:pPr marL="0" marR="0" lvl="0" indent="0" algn="l" defTabSz="914400" rtl="0" eaLnBrk="1" fontAlgn="auto" latinLnBrk="0" hangingPunct="1">
+                      <a:pPr marL="0" marR="0" lvl="0" indent="0" algn="ctr" defTabSz="914400" rtl="0" eaLnBrk="1" fontAlgn="auto" latinLnBrk="0" hangingPunct="1">
                         <a:lnSpc>
                           <a:spcPct val="100000"/>
                         </a:lnSpc>
@@ -5424,9 +5469,9 @@
                         <a:defRPr/>
                       </a:pPr>
                       <a:r>
-                        <a:rPr lang="es-ES" sz="1800" kern="1200" dirty="0">
+                        <a:rPr lang="es-ES" sz="1800" b="1" kern="1200" dirty="0">
                           <a:solidFill>
-                            <a:schemeClr val="accent2"/>
+                            <a:srgbClr val="FF0000"/>
                           </a:solidFill>
                           <a:effectLst/>
                           <a:latin typeface="+mn-lt"/>
@@ -5437,7 +5482,7 @@
                       </a:r>
                     </a:p>
                     <a:p>
-                      <a:pPr marL="0" marR="0" lvl="0" indent="0" algn="l" defTabSz="914400" rtl="0" eaLnBrk="1" fontAlgn="auto" latinLnBrk="0" hangingPunct="1">
+                      <a:pPr marL="0" marR="0" lvl="0" indent="0" algn="ctr" defTabSz="914400" rtl="0" eaLnBrk="1" fontAlgn="auto" latinLnBrk="0" hangingPunct="1">
                         <a:lnSpc>
                           <a:spcPct val="100000"/>
                         </a:lnSpc>
@@ -5464,7 +5509,7 @@
                           <a:ea typeface="+mn-ea"/>
                           <a:cs typeface="+mn-cs"/>
                         </a:rPr>
-                        <a:t>*(1 - p2dd)*(1 - q2dd)</a:t>
+                        <a:t>·(1 - p2dd)·(1 - q2dd)</a:t>
                       </a:r>
                     </a:p>
                   </a:txBody>

</xml_diff>